<commit_message>
01/18 ppt & minor
</commit_message>
<xml_diff>
--- a/口試0118.pptx
+++ b/口試0118.pptx
@@ -1394,7 +1394,7 @@
           <a:bodyPr/>
           <a:lstStyle/>
           <a:p>
-            <a:endParaRPr kumimoji="1" lang="zh-TW" altLang="en-US"/>
+            <a:endParaRPr kumimoji="1" lang="zh-TW" altLang="en-US" dirty="0"/>
           </a:p>
         </p:txBody>
       </p:sp>
@@ -1415,6 +1415,90 @@
           <a:p>
             <a:fld id="{F62DB7E0-A0AD-3C46-8E67-57B3F81190C8}" type="slidenum">
               <a:rPr kumimoji="1" lang="zh-TW" altLang="en-US" smtClean="0"/>
+              <a:t>20</a:t>
+            </a:fld>
+            <a:endParaRPr kumimoji="1" lang="zh-TW" altLang="en-US"/>
+          </a:p>
+        </p:txBody>
+      </p:sp>
+    </p:spTree>
+    <p:extLst>
+      <p:ext uri="{BB962C8B-B14F-4D97-AF65-F5344CB8AC3E}">
+        <p14:creationId xmlns:p14="http://schemas.microsoft.com/office/powerpoint/2010/main" val="1724717192"/>
+      </p:ext>
+    </p:extLst>
+  </p:cSld>
+  <p:clrMapOvr>
+    <a:masterClrMapping/>
+  </p:clrMapOvr>
+</p:notes>
+</file>
+
+<file path=ppt/notesSlides/notesSlide8.xml><?xml version="1.0" encoding="utf-8"?>
+<p:notes xmlns:a="http://schemas.openxmlformats.org/drawingml/2006/main" xmlns:r="http://schemas.openxmlformats.org/officeDocument/2006/relationships" xmlns:p="http://schemas.openxmlformats.org/presentationml/2006/main">
+  <p:cSld>
+    <p:spTree>
+      <p:nvGrpSpPr>
+        <p:cNvPr id="1" name=""/>
+        <p:cNvGrpSpPr/>
+        <p:nvPr/>
+      </p:nvGrpSpPr>
+      <p:grpSpPr>
+        <a:xfrm>
+          <a:off x="0" y="0"/>
+          <a:ext cx="0" cy="0"/>
+          <a:chOff x="0" y="0"/>
+          <a:chExt cx="0" cy="0"/>
+        </a:xfrm>
+      </p:grpSpPr>
+      <p:sp>
+        <p:nvSpPr>
+          <p:cNvPr id="2" name="投影片影像版面配置區 1"/>
+          <p:cNvSpPr>
+            <a:spLocks noGrp="1" noRot="1" noChangeAspect="1"/>
+          </p:cNvSpPr>
+          <p:nvPr>
+            <p:ph type="sldImg"/>
+          </p:nvPr>
+        </p:nvSpPr>
+        <p:spPr/>
+      </p:sp>
+      <p:sp>
+        <p:nvSpPr>
+          <p:cNvPr id="3" name="備忘稿版面配置區 2"/>
+          <p:cNvSpPr>
+            <a:spLocks noGrp="1"/>
+          </p:cNvSpPr>
+          <p:nvPr>
+            <p:ph type="body" idx="1"/>
+          </p:nvPr>
+        </p:nvSpPr>
+        <p:spPr/>
+        <p:txBody>
+          <a:bodyPr/>
+          <a:lstStyle/>
+          <a:p>
+            <a:endParaRPr kumimoji="1" lang="zh-TW" altLang="en-US"/>
+          </a:p>
+        </p:txBody>
+      </p:sp>
+      <p:sp>
+        <p:nvSpPr>
+          <p:cNvPr id="4" name="投影片編號版面配置區 3"/>
+          <p:cNvSpPr>
+            <a:spLocks noGrp="1"/>
+          </p:cNvSpPr>
+          <p:nvPr>
+            <p:ph type="sldNum" sz="quarter" idx="10"/>
+          </p:nvPr>
+        </p:nvSpPr>
+        <p:spPr/>
+        <p:txBody>
+          <a:bodyPr/>
+          <a:lstStyle/>
+          <a:p>
+            <a:fld id="{F62DB7E0-A0AD-3C46-8E67-57B3F81190C8}" type="slidenum">
+              <a:rPr kumimoji="1" lang="zh-TW" altLang="en-US" smtClean="0"/>
               <a:t>23</a:t>
             </a:fld>
             <a:endParaRPr kumimoji="1" lang="zh-TW" altLang="en-US"/>
@@ -1434,7 +1518,7 @@
 </p:notes>
 </file>
 
-<file path=ppt/notesSlides/notesSlide8.xml><?xml version="1.0" encoding="utf-8"?>
+<file path=ppt/notesSlides/notesSlide9.xml><?xml version="1.0" encoding="utf-8"?>
 <p:notes xmlns:a="http://schemas.openxmlformats.org/drawingml/2006/main" xmlns:r="http://schemas.openxmlformats.org/officeDocument/2006/relationships" xmlns:p="http://schemas.openxmlformats.org/presentationml/2006/main">
   <p:cSld>
     <p:spTree>
@@ -7076,7 +7160,7 @@
               <a:p>
                 <a:pPr algn="ctr"/>
                 <a:r>
-                  <a:rPr kumimoji="1" lang="en-US" altLang="zh-TW" sz="2000" dirty="0">
+                  <a:rPr kumimoji="1" lang="en-US" altLang="zh-TW" sz="2000" dirty="0" smtClean="0">
                     <a:solidFill>
                       <a:schemeClr val="tx1"/>
                     </a:solidFill>
@@ -7084,7 +7168,7 @@
                   <a:t>Practice</a:t>
                 </a:r>
                 <a:r>
-                  <a:rPr kumimoji="1" lang="zh-TW" altLang="en-US" sz="2000" dirty="0">
+                  <a:rPr kumimoji="1" lang="zh-TW" altLang="en-US" sz="2000" dirty="0" smtClean="0">
                     <a:solidFill>
                       <a:schemeClr val="tx1"/>
                     </a:solidFill>
@@ -7092,12 +7176,12 @@
                   <a:t> </a:t>
                 </a:r>
                 <a:r>
-                  <a:rPr kumimoji="1" lang="en-US" altLang="zh-TW" sz="2000" dirty="0">
+                  <a:rPr kumimoji="1" lang="en-US" altLang="zh-TW" sz="2000" dirty="0" smtClean="0">
                     <a:solidFill>
                       <a:schemeClr val="tx1"/>
                     </a:solidFill>
                   </a:rPr>
-                  <a:t>part</a:t>
+                  <a:t>mode</a:t>
                 </a:r>
                 <a:endParaRPr kumimoji="1" lang="zh-TW" altLang="en-US" sz="2000" dirty="0">
                   <a:solidFill>
@@ -8781,28 +8865,43 @@
                 <a:latin typeface="+mj-ea"/>
                 <a:ea typeface="+mj-ea"/>
               </a:rPr>
-              <a:t> Clementi</a:t>
-            </a:r>
+              <a:t> </a:t>
+            </a:r>
+            <a:r>
+              <a:rPr lang="en-US" altLang="zh-TW" sz="2800" dirty="0" smtClean="0">
+                <a:latin typeface="+mj-ea"/>
+                <a:ea typeface="+mj-ea"/>
+              </a:rPr>
+              <a:t>Clementi</a:t>
+            </a:r>
+          </a:p>
+          <a:p>
             <a:r>
               <a:rPr lang="zh-TW" altLang="en-US" sz="2800" dirty="0" smtClean="0">
                 <a:latin typeface="+mj-ea"/>
-                <a:ea typeface="+mj-ea"/>
-              </a:rPr>
-              <a:t> </a:t>
-            </a:r>
-            <a:endParaRPr lang="en-US" altLang="zh-TW" sz="2800" dirty="0" smtClean="0">
+              </a:rPr>
+              <a:t> </a:t>
+            </a:r>
+            <a:r>
+              <a:rPr lang="en-US" altLang="zh-TW" sz="2800" u="sng" dirty="0" smtClean="0">
+                <a:latin typeface="+mj-ea"/>
+              </a:rPr>
+              <a:t>Variety</a:t>
+            </a:r>
+            <a:r>
+              <a:rPr lang="zh-TW" altLang="en-US" sz="2800" u="sng" dirty="0" smtClean="0">
+                <a:latin typeface="+mj-ea"/>
+                <a:ea typeface="+mj-ea"/>
+              </a:rPr>
+              <a:t> </a:t>
+            </a:r>
+            <a:endParaRPr lang="en-US" altLang="zh-TW" sz="2800" u="sng" dirty="0" smtClean="0">
               <a:latin typeface="+mj-ea"/>
               <a:ea typeface="+mj-ea"/>
             </a:endParaRPr>
           </a:p>
           <a:p>
             <a:endParaRPr lang="en-US" altLang="zh-TW" sz="2800" dirty="0" smtClean="0">
-              <a:latin typeface="+mj-ea"/>
-              <a:ea typeface="+mj-ea"/>
-            </a:endParaRPr>
-          </a:p>
-          <a:p>
-            <a:endParaRPr lang="en-US" altLang="zh-TW" sz="2800" dirty="0">
               <a:latin typeface="+mj-ea"/>
               <a:ea typeface="+mj-ea"/>
             </a:endParaRPr>
@@ -8870,7 +8969,7 @@
         </p:blipFill>
         <p:spPr>
           <a:xfrm>
-            <a:off x="4819304" y="1731001"/>
+            <a:off x="4845191" y="1805645"/>
             <a:ext cx="2495896" cy="1729789"/>
           </a:xfrm>
           <a:prstGeom prst="rect">
@@ -9198,8 +9297,8 @@
         </p:nvSpPr>
         <p:spPr>
           <a:xfrm>
-            <a:off x="265921" y="1421079"/>
-            <a:ext cx="8915400" cy="6452261"/>
+            <a:off x="265921" y="1421080"/>
+            <a:ext cx="8915400" cy="1983760"/>
           </a:xfrm>
         </p:spPr>
         <p:txBody>
@@ -9243,32 +9342,6 @@
               </a:rPr>
               <a:t>Rhythm</a:t>
             </a:r>
-          </a:p>
-          <a:p>
-            <a:endParaRPr lang="en-US" altLang="zh-TW" sz="2800" dirty="0">
-              <a:latin typeface="+mj-ea"/>
-              <a:ea typeface="+mj-ea"/>
-            </a:endParaRPr>
-          </a:p>
-          <a:p>
-            <a:endParaRPr lang="en-US" altLang="zh-TW" sz="2800" dirty="0" smtClean="0">
-              <a:latin typeface="+mj-ea"/>
-              <a:ea typeface="+mj-ea"/>
-            </a:endParaRPr>
-          </a:p>
-          <a:p>
-            <a:endParaRPr lang="en-US" altLang="zh-TW" sz="2800" dirty="0">
-              <a:latin typeface="+mj-ea"/>
-              <a:ea typeface="+mj-ea"/>
-            </a:endParaRPr>
-          </a:p>
-          <a:p>
-            <a:endParaRPr lang="en-US" altLang="zh-TW" sz="2800" dirty="0" smtClean="0">
-              <a:latin typeface="+mj-ea"/>
-              <a:ea typeface="+mj-ea"/>
-            </a:endParaRPr>
-          </a:p>
-          <a:p>
             <a:endParaRPr lang="en-US" altLang="zh-TW" sz="2800" dirty="0" smtClean="0">
               <a:latin typeface="+mj-ea"/>
               <a:ea typeface="+mj-ea"/>
@@ -9581,30 +9654,6 @@
               <a:ea typeface="+mj-ea"/>
             </a:endParaRPr>
           </a:p>
-          <a:p>
-            <a:endParaRPr lang="en-US" altLang="zh-TW" sz="2800" dirty="0" smtClean="0">
-              <a:latin typeface="+mj-ea"/>
-              <a:ea typeface="+mj-ea"/>
-            </a:endParaRPr>
-          </a:p>
-          <a:p>
-            <a:endParaRPr lang="en-US" altLang="zh-TW" sz="2800" dirty="0" smtClean="0">
-              <a:latin typeface="+mj-ea"/>
-              <a:ea typeface="+mj-ea"/>
-            </a:endParaRPr>
-          </a:p>
-          <a:p>
-            <a:endParaRPr lang="en-US" altLang="zh-TW" sz="2800" dirty="0" smtClean="0">
-              <a:latin typeface="+mj-ea"/>
-              <a:ea typeface="+mj-ea"/>
-            </a:endParaRPr>
-          </a:p>
-          <a:p>
-            <a:endParaRPr lang="en-US" altLang="zh-TW" sz="2800" dirty="0" smtClean="0">
-              <a:latin typeface="+mj-ea"/>
-              <a:ea typeface="+mj-ea"/>
-            </a:endParaRPr>
-          </a:p>
         </p:txBody>
       </p:sp>
       <p:sp>
@@ -9684,9 +9733,107 @@
   <p:timing>
     <p:tnLst>
       <p:par>
-        <p:cTn id="1" dur="indefinite" restart="never" nodeType="tmRoot"/>
+        <p:cTn id="1" dur="indefinite" restart="never" nodeType="tmRoot">
+          <p:childTnLst>
+            <p:seq concurrent="1" nextAc="seek">
+              <p:cTn id="2" dur="indefinite" nodeType="mainSeq">
+                <p:childTnLst>
+                  <p:par>
+                    <p:cTn id="3" fill="hold">
+                      <p:stCondLst>
+                        <p:cond delay="indefinite"/>
+                      </p:stCondLst>
+                      <p:childTnLst>
+                        <p:par>
+                          <p:cTn id="4" fill="hold">
+                            <p:stCondLst>
+                              <p:cond delay="0"/>
+                            </p:stCondLst>
+                            <p:childTnLst>
+                              <p:par>
+                                <p:cTn id="5" presetID="1" presetClass="entr" presetSubtype="0" fill="hold" nodeType="clickEffect">
+                                  <p:stCondLst>
+                                    <p:cond delay="0"/>
+                                  </p:stCondLst>
+                                  <p:childTnLst>
+                                    <p:set>
+                                      <p:cBhvr>
+                                        <p:cTn id="6" dur="1" fill="hold">
+                                          <p:stCondLst>
+                                            <p:cond delay="0"/>
+                                          </p:stCondLst>
+                                        </p:cTn>
+                                        <p:tgtEl>
+                                          <p:spTgt spid="20"/>
+                                        </p:tgtEl>
+                                        <p:attrNameLst>
+                                          <p:attrName>style.visibility</p:attrName>
+                                        </p:attrNameLst>
+                                      </p:cBhvr>
+                                      <p:to>
+                                        <p:strVal val="visible"/>
+                                      </p:to>
+                                    </p:set>
+                                  </p:childTnLst>
+                                </p:cTn>
+                              </p:par>
+                              <p:par>
+                                <p:cTn id="7" presetID="1" presetClass="entr" presetSubtype="0" fill="hold" grpId="0" nodeType="withEffect">
+                                  <p:stCondLst>
+                                    <p:cond delay="0"/>
+                                  </p:stCondLst>
+                                  <p:childTnLst>
+                                    <p:set>
+                                      <p:cBhvr>
+                                        <p:cTn id="8" dur="1" fill="hold">
+                                          <p:stCondLst>
+                                            <p:cond delay="0"/>
+                                          </p:stCondLst>
+                                        </p:cTn>
+                                        <p:tgtEl>
+                                          <p:spTgt spid="10"/>
+                                        </p:tgtEl>
+                                        <p:attrNameLst>
+                                          <p:attrName>style.visibility</p:attrName>
+                                        </p:attrNameLst>
+                                      </p:cBhvr>
+                                      <p:to>
+                                        <p:strVal val="visible"/>
+                                      </p:to>
+                                    </p:set>
+                                  </p:childTnLst>
+                                </p:cTn>
+                              </p:par>
+                            </p:childTnLst>
+                          </p:cTn>
+                        </p:par>
+                      </p:childTnLst>
+                    </p:cTn>
+                  </p:par>
+                </p:childTnLst>
+              </p:cTn>
+              <p:prevCondLst>
+                <p:cond evt="onPrev" delay="0">
+                  <p:tgtEl>
+                    <p:sldTgt/>
+                  </p:tgtEl>
+                </p:cond>
+              </p:prevCondLst>
+              <p:nextCondLst>
+                <p:cond evt="onNext" delay="0">
+                  <p:tgtEl>
+                    <p:sldTgt/>
+                  </p:tgtEl>
+                </p:cond>
+              </p:nextCondLst>
+            </p:seq>
+          </p:childTnLst>
+        </p:cTn>
       </p:par>
     </p:tnLst>
+    <p:bldLst>
+      <p:bldP spid="10" grpId="0"/>
+    </p:bldLst>
   </p:timing>
 </p:sld>
 </file>
@@ -10512,9 +10659,123 @@
   <p:timing>
     <p:tnLst>
       <p:par>
-        <p:cTn id="1" dur="indefinite" restart="never" nodeType="tmRoot"/>
+        <p:cTn id="1" dur="indefinite" restart="never" nodeType="tmRoot">
+          <p:childTnLst>
+            <p:seq concurrent="1" nextAc="seek">
+              <p:cTn id="2" dur="indefinite" nodeType="mainSeq">
+                <p:childTnLst>
+                  <p:par>
+                    <p:cTn id="3" fill="hold">
+                      <p:stCondLst>
+                        <p:cond delay="indefinite"/>
+                      </p:stCondLst>
+                      <p:childTnLst>
+                        <p:par>
+                          <p:cTn id="4" fill="hold">
+                            <p:stCondLst>
+                              <p:cond delay="0"/>
+                            </p:stCondLst>
+                            <p:childTnLst>
+                              <p:par>
+                                <p:cTn id="5" presetID="10" presetClass="entr" presetSubtype="0" fill="hold" nodeType="clickEffect">
+                                  <p:stCondLst>
+                                    <p:cond delay="0"/>
+                                  </p:stCondLst>
+                                  <p:childTnLst>
+                                    <p:set>
+                                      <p:cBhvr>
+                                        <p:cTn id="6" dur="1" fill="hold">
+                                          <p:stCondLst>
+                                            <p:cond delay="0"/>
+                                          </p:stCondLst>
+                                        </p:cTn>
+                                        <p:tgtEl>
+                                          <p:spTgt spid="5"/>
+                                        </p:tgtEl>
+                                        <p:attrNameLst>
+                                          <p:attrName>style.visibility</p:attrName>
+                                        </p:attrNameLst>
+                                      </p:cBhvr>
+                                      <p:to>
+                                        <p:strVal val="visible"/>
+                                      </p:to>
+                                    </p:set>
+                                    <p:animEffect transition="in" filter="fade">
+                                      <p:cBhvr>
+                                        <p:cTn id="7" dur="500"/>
+                                        <p:tgtEl>
+                                          <p:spTgt spid="5"/>
+                                        </p:tgtEl>
+                                      </p:cBhvr>
+                                    </p:animEffect>
+                                  </p:childTnLst>
+                                </p:cTn>
+                              </p:par>
+                              <p:par>
+                                <p:cTn id="8" presetID="10" presetClass="entr" presetSubtype="0" fill="hold" grpId="0" nodeType="withEffect">
+                                  <p:stCondLst>
+                                    <p:cond delay="0"/>
+                                  </p:stCondLst>
+                                  <p:childTnLst>
+                                    <p:set>
+                                      <p:cBhvr>
+                                        <p:cTn id="9" dur="1" fill="hold">
+                                          <p:stCondLst>
+                                            <p:cond delay="0"/>
+                                          </p:stCondLst>
+                                        </p:cTn>
+                                        <p:tgtEl>
+                                          <p:spTgt spid="6"/>
+                                        </p:tgtEl>
+                                        <p:attrNameLst>
+                                          <p:attrName>style.visibility</p:attrName>
+                                        </p:attrNameLst>
+                                      </p:cBhvr>
+                                      <p:to>
+                                        <p:strVal val="visible"/>
+                                      </p:to>
+                                    </p:set>
+                                    <p:animEffect transition="in" filter="fade">
+                                      <p:cBhvr>
+                                        <p:cTn id="10" dur="500"/>
+                                        <p:tgtEl>
+                                          <p:spTgt spid="6"/>
+                                        </p:tgtEl>
+                                      </p:cBhvr>
+                                    </p:animEffect>
+                                  </p:childTnLst>
+                                </p:cTn>
+                              </p:par>
+                            </p:childTnLst>
+                          </p:cTn>
+                        </p:par>
+                      </p:childTnLst>
+                    </p:cTn>
+                  </p:par>
+                </p:childTnLst>
+              </p:cTn>
+              <p:prevCondLst>
+                <p:cond evt="onPrev" delay="0">
+                  <p:tgtEl>
+                    <p:sldTgt/>
+                  </p:tgtEl>
+                </p:cond>
+              </p:prevCondLst>
+              <p:nextCondLst>
+                <p:cond evt="onNext" delay="0">
+                  <p:tgtEl>
+                    <p:sldTgt/>
+                  </p:tgtEl>
+                </p:cond>
+              </p:nextCondLst>
+            </p:seq>
+          </p:childTnLst>
+        </p:cTn>
       </p:par>
     </p:tnLst>
+    <p:bldLst>
+      <p:bldP spid="6" grpId="0"/>
+    </p:bldLst>
   </p:timing>
 </p:sld>
 </file>
@@ -11767,7 +12028,7 @@
         </p:nvSpPr>
         <p:spPr>
           <a:xfrm>
-            <a:off x="1401038" y="1357924"/>
+            <a:off x="1371600" y="1476876"/>
             <a:ext cx="9601200" cy="3581400"/>
           </a:xfrm>
         </p:spPr>
@@ -12943,98 +13204,6 @@
       </p:pic>
       <p:sp>
         <p:nvSpPr>
-          <p:cNvPr id="10" name="橢圓 9"/>
-          <p:cNvSpPr/>
-          <p:nvPr/>
-        </p:nvSpPr>
-        <p:spPr>
-          <a:xfrm>
-            <a:off x="8213558" y="1957137"/>
-            <a:ext cx="569494" cy="481263"/>
-          </a:xfrm>
-          <a:prstGeom prst="ellipse">
-            <a:avLst/>
-          </a:prstGeom>
-          <a:noFill/>
-          <a:ln w="57150">
-            <a:solidFill>
-              <a:schemeClr val="accent5"/>
-            </a:solidFill>
-          </a:ln>
-        </p:spPr>
-        <p:style>
-          <a:lnRef idx="2">
-            <a:schemeClr val="accent1">
-              <a:shade val="50000"/>
-            </a:schemeClr>
-          </a:lnRef>
-          <a:fillRef idx="1">
-            <a:schemeClr val="accent1"/>
-          </a:fillRef>
-          <a:effectRef idx="0">
-            <a:schemeClr val="accent1"/>
-          </a:effectRef>
-          <a:fontRef idx="minor">
-            <a:schemeClr val="lt1"/>
-          </a:fontRef>
-        </p:style>
-        <p:txBody>
-          <a:bodyPr rtlCol="0" anchor="ctr"/>
-          <a:lstStyle/>
-          <a:p>
-            <a:pPr algn="ctr"/>
-            <a:endParaRPr kumimoji="1" lang="zh-TW" altLang="en-US"/>
-          </a:p>
-        </p:txBody>
-      </p:sp>
-      <p:sp>
-        <p:nvSpPr>
-          <p:cNvPr id="11" name="橢圓 10"/>
-          <p:cNvSpPr/>
-          <p:nvPr/>
-        </p:nvSpPr>
-        <p:spPr>
-          <a:xfrm>
-            <a:off x="9488905" y="2171700"/>
-            <a:ext cx="569495" cy="387240"/>
-          </a:xfrm>
-          <a:prstGeom prst="ellipse">
-            <a:avLst/>
-          </a:prstGeom>
-          <a:noFill/>
-          <a:ln w="57150">
-            <a:solidFill>
-              <a:schemeClr val="accent5"/>
-            </a:solidFill>
-          </a:ln>
-        </p:spPr>
-        <p:style>
-          <a:lnRef idx="2">
-            <a:schemeClr val="accent1">
-              <a:shade val="50000"/>
-            </a:schemeClr>
-          </a:lnRef>
-          <a:fillRef idx="1">
-            <a:schemeClr val="accent1"/>
-          </a:fillRef>
-          <a:effectRef idx="0">
-            <a:schemeClr val="accent1"/>
-          </a:effectRef>
-          <a:fontRef idx="minor">
-            <a:schemeClr val="lt1"/>
-          </a:fontRef>
-        </p:style>
-        <p:txBody>
-          <a:bodyPr rtlCol="0" anchor="ctr"/>
-          <a:lstStyle/>
-          <a:p>
-            <a:pPr algn="ctr"/>
-            <a:endParaRPr kumimoji="1" lang="zh-TW" altLang="en-US"/>
-          </a:p>
-        </p:txBody>
-      </p:sp>
-      <p:sp>
-        <p:nvSpPr>
           <p:cNvPr id="12" name="圓角矩形 11"/>
           <p:cNvSpPr/>
           <p:nvPr/>
@@ -13237,7 +13406,9 @@
           </a:prstGeom>
           <a:ln w="57150">
             <a:solidFill>
-              <a:schemeClr val="accent5"/>
+              <a:schemeClr val="accent6">
+                <a:lumMod val="75000"/>
+              </a:schemeClr>
             </a:solidFill>
           </a:ln>
         </p:spPr>
@@ -13326,6 +13497,118 @@
           </a:fontRef>
         </p:style>
       </p:cxnSp>
+      <p:sp>
+        <p:nvSpPr>
+          <p:cNvPr id="4" name="禁止標誌 3"/>
+          <p:cNvSpPr/>
+          <p:nvPr/>
+        </p:nvSpPr>
+        <p:spPr>
+          <a:xfrm>
+            <a:off x="8261709" y="2031662"/>
+            <a:ext cx="425116" cy="392700"/>
+          </a:xfrm>
+          <a:prstGeom prst="noSmoking">
+            <a:avLst/>
+          </a:prstGeom>
+          <a:solidFill>
+            <a:schemeClr val="accent6">
+              <a:lumMod val="75000"/>
+            </a:schemeClr>
+          </a:solidFill>
+          <a:ln>
+            <a:solidFill>
+              <a:schemeClr val="accent6">
+                <a:lumMod val="75000"/>
+              </a:schemeClr>
+            </a:solidFill>
+          </a:ln>
+        </p:spPr>
+        <p:style>
+          <a:lnRef idx="2">
+            <a:schemeClr val="accent1">
+              <a:shade val="50000"/>
+            </a:schemeClr>
+          </a:lnRef>
+          <a:fillRef idx="1">
+            <a:schemeClr val="accent1"/>
+          </a:fillRef>
+          <a:effectRef idx="0">
+            <a:schemeClr val="accent1"/>
+          </a:effectRef>
+          <a:fontRef idx="minor">
+            <a:schemeClr val="lt1"/>
+          </a:fontRef>
+        </p:style>
+        <p:txBody>
+          <a:bodyPr rtlCol="0" anchor="ctr"/>
+          <a:lstStyle/>
+          <a:p>
+            <a:pPr algn="ctr"/>
+            <a:endParaRPr kumimoji="1" lang="zh-TW" altLang="en-US">
+              <a:solidFill>
+                <a:schemeClr val="tx1"/>
+              </a:solidFill>
+            </a:endParaRPr>
+          </a:p>
+        </p:txBody>
+      </p:sp>
+      <p:sp>
+        <p:nvSpPr>
+          <p:cNvPr id="16" name="禁止標誌 15"/>
+          <p:cNvSpPr/>
+          <p:nvPr/>
+        </p:nvSpPr>
+        <p:spPr>
+          <a:xfrm>
+            <a:off x="9603228" y="2182840"/>
+            <a:ext cx="405040" cy="394146"/>
+          </a:xfrm>
+          <a:prstGeom prst="noSmoking">
+            <a:avLst/>
+          </a:prstGeom>
+          <a:solidFill>
+            <a:schemeClr val="accent6">
+              <a:lumMod val="75000"/>
+            </a:schemeClr>
+          </a:solidFill>
+          <a:ln>
+            <a:solidFill>
+              <a:schemeClr val="accent6">
+                <a:lumMod val="75000"/>
+              </a:schemeClr>
+            </a:solidFill>
+          </a:ln>
+        </p:spPr>
+        <p:style>
+          <a:lnRef idx="2">
+            <a:schemeClr val="accent1">
+              <a:shade val="50000"/>
+            </a:schemeClr>
+          </a:lnRef>
+          <a:fillRef idx="1">
+            <a:schemeClr val="accent1"/>
+          </a:fillRef>
+          <a:effectRef idx="0">
+            <a:schemeClr val="accent1"/>
+          </a:effectRef>
+          <a:fontRef idx="minor">
+            <a:schemeClr val="lt1"/>
+          </a:fontRef>
+        </p:style>
+        <p:txBody>
+          <a:bodyPr rtlCol="0" anchor="ctr"/>
+          <a:lstStyle/>
+          <a:p>
+            <a:pPr algn="ctr"/>
+            <a:endParaRPr kumimoji="1" lang="zh-TW" altLang="en-US">
+              <a:solidFill>
+                <a:schemeClr val="tx1"/>
+              </a:solidFill>
+            </a:endParaRPr>
+          </a:p>
+        </p:txBody>
+      </p:sp>
     </p:spTree>
     <p:extLst>
       <p:ext uri="{BB962C8B-B14F-4D97-AF65-F5344CB8AC3E}">
@@ -13348,6 +13631,9 @@
                     <p:cTn id="3" fill="hold">
                       <p:stCondLst>
                         <p:cond delay="indefinite"/>
+                        <p:cond evt="onBegin" delay="0">
+                          <p:tn val="2"/>
+                        </p:cond>
                       </p:stCondLst>
                       <p:childTnLst>
                         <p:par>
@@ -13357,7 +13643,7 @@
                             </p:stCondLst>
                             <p:childTnLst>
                               <p:par>
-                                <p:cTn id="5" presetID="1" presetClass="entr" presetSubtype="0" fill="hold" grpId="0" nodeType="clickEffect">
+                                <p:cTn id="5" presetID="9" presetClass="entr" presetSubtype="0" fill="hold" nodeType="withEffect">
                                   <p:stCondLst>
                                     <p:cond delay="0"/>
                                   </p:stCondLst>
@@ -13365,60 +13651,6 @@
                                     <p:set>
                                       <p:cBhvr>
                                         <p:cTn id="6" dur="1" fill="hold">
-                                          <p:stCondLst>
-                                            <p:cond delay="0"/>
-                                          </p:stCondLst>
-                                        </p:cTn>
-                                        <p:tgtEl>
-                                          <p:spTgt spid="10"/>
-                                        </p:tgtEl>
-                                        <p:attrNameLst>
-                                          <p:attrName>style.visibility</p:attrName>
-                                        </p:attrNameLst>
-                                      </p:cBhvr>
-                                      <p:to>
-                                        <p:strVal val="visible"/>
-                                      </p:to>
-                                    </p:set>
-                                  </p:childTnLst>
-                                </p:cTn>
-                              </p:par>
-                              <p:par>
-                                <p:cTn id="7" presetID="1" presetClass="entr" presetSubtype="0" fill="hold" grpId="0" nodeType="withEffect">
-                                  <p:stCondLst>
-                                    <p:cond delay="0"/>
-                                  </p:stCondLst>
-                                  <p:childTnLst>
-                                    <p:set>
-                                      <p:cBhvr>
-                                        <p:cTn id="8" dur="1" fill="hold">
-                                          <p:stCondLst>
-                                            <p:cond delay="0"/>
-                                          </p:stCondLst>
-                                        </p:cTn>
-                                        <p:tgtEl>
-                                          <p:spTgt spid="11"/>
-                                        </p:tgtEl>
-                                        <p:attrNameLst>
-                                          <p:attrName>style.visibility</p:attrName>
-                                        </p:attrNameLst>
-                                      </p:cBhvr>
-                                      <p:to>
-                                        <p:strVal val="visible"/>
-                                      </p:to>
-                                    </p:set>
-                                  </p:childTnLst>
-                                </p:cTn>
-                              </p:par>
-                              <p:par>
-                                <p:cTn id="9" presetID="9" presetClass="entr" presetSubtype="0" fill="hold" nodeType="withEffect">
-                                  <p:stCondLst>
-                                    <p:cond delay="0"/>
-                                  </p:stCondLst>
-                                  <p:childTnLst>
-                                    <p:set>
-                                      <p:cBhvr>
-                                        <p:cTn id="10" dur="1" fill="hold">
                                           <p:stCondLst>
                                             <p:cond delay="0"/>
                                           </p:stCondLst>
@@ -13436,9 +13668,79 @@
                                     </p:set>
                                     <p:animEffect transition="in" filter="dissolve">
                                       <p:cBhvr>
-                                        <p:cTn id="11" dur="500"/>
+                                        <p:cTn id="7" dur="500"/>
                                         <p:tgtEl>
                                           <p:spTgt spid="19"/>
+                                        </p:tgtEl>
+                                      </p:cBhvr>
+                                    </p:animEffect>
+                                  </p:childTnLst>
+                                </p:cTn>
+                              </p:par>
+                              <p:par>
+                                <p:cTn id="8" presetID="5" presetClass="entr" presetSubtype="10" fill="hold" grpId="0" nodeType="withEffect">
+                                  <p:stCondLst>
+                                    <p:cond delay="0"/>
+                                  </p:stCondLst>
+                                  <p:childTnLst>
+                                    <p:set>
+                                      <p:cBhvr>
+                                        <p:cTn id="9" dur="1" fill="hold">
+                                          <p:stCondLst>
+                                            <p:cond delay="0"/>
+                                          </p:stCondLst>
+                                        </p:cTn>
+                                        <p:tgtEl>
+                                          <p:spTgt spid="4"/>
+                                        </p:tgtEl>
+                                        <p:attrNameLst>
+                                          <p:attrName>style.visibility</p:attrName>
+                                        </p:attrNameLst>
+                                      </p:cBhvr>
+                                      <p:to>
+                                        <p:strVal val="visible"/>
+                                      </p:to>
+                                    </p:set>
+                                    <p:animEffect transition="in" filter="checkerboard(across)">
+                                      <p:cBhvr>
+                                        <p:cTn id="10" dur="500"/>
+                                        <p:tgtEl>
+                                          <p:spTgt spid="4"/>
+                                        </p:tgtEl>
+                                      </p:cBhvr>
+                                    </p:animEffect>
+                                  </p:childTnLst>
+                                </p:cTn>
+                              </p:par>
+                              <p:par>
+                                <p:cTn id="11" presetID="5" presetClass="entr" presetSubtype="10" fill="hold" grpId="0" nodeType="withEffect">
+                                  <p:stCondLst>
+                                    <p:cond delay="0"/>
+                                  </p:stCondLst>
+                                  <p:childTnLst>
+                                    <p:set>
+                                      <p:cBhvr>
+                                        <p:cTn id="12" dur="1" fill="hold">
+                                          <p:stCondLst>
+                                            <p:cond delay="0"/>
+                                          </p:stCondLst>
+                                        </p:cTn>
+                                        <p:tgtEl>
+                                          <p:spTgt spid="16"/>
+                                        </p:tgtEl>
+                                        <p:attrNameLst>
+                                          <p:attrName>style.visibility</p:attrName>
+                                        </p:attrNameLst>
+                                      </p:cBhvr>
+                                      <p:to>
+                                        <p:strVal val="visible"/>
+                                      </p:to>
+                                    </p:set>
+                                    <p:animEffect transition="in" filter="checkerboard(across)">
+                                      <p:cBhvr>
+                                        <p:cTn id="13" dur="500"/>
+                                        <p:tgtEl>
+                                          <p:spTgt spid="16"/>
                                         </p:tgtEl>
                                       </p:cBhvr>
                                     </p:animEffect>
@@ -13452,80 +13754,26 @@
                     </p:cTn>
                   </p:par>
                   <p:par>
-                    <p:cTn id="12" fill="hold">
+                    <p:cTn id="14" fill="hold">
                       <p:stCondLst>
                         <p:cond delay="indefinite"/>
                       </p:stCondLst>
                       <p:childTnLst>
                         <p:par>
-                          <p:cTn id="13" fill="hold">
+                          <p:cTn id="15" fill="hold">
                             <p:stCondLst>
                               <p:cond delay="0"/>
                             </p:stCondLst>
                             <p:childTnLst>
                               <p:par>
-                                <p:cTn id="14" presetID="1" presetClass="exit" presetSubtype="0" fill="hold" grpId="1" nodeType="clickEffect">
-                                  <p:stCondLst>
-                                    <p:cond delay="0"/>
-                                  </p:stCondLst>
-                                  <p:childTnLst>
-                                    <p:set>
-                                      <p:cBhvr>
-                                        <p:cTn id="15" dur="1" fill="hold">
-                                          <p:stCondLst>
-                                            <p:cond delay="0"/>
-                                          </p:stCondLst>
-                                        </p:cTn>
-                                        <p:tgtEl>
-                                          <p:spTgt spid="10"/>
-                                        </p:tgtEl>
-                                        <p:attrNameLst>
-                                          <p:attrName>style.visibility</p:attrName>
-                                        </p:attrNameLst>
-                                      </p:cBhvr>
-                                      <p:to>
-                                        <p:strVal val="hidden"/>
-                                      </p:to>
-                                    </p:set>
-                                  </p:childTnLst>
-                                </p:cTn>
-                              </p:par>
-                              <p:par>
-                                <p:cTn id="16" presetID="1" presetClass="exit" presetSubtype="0" fill="hold" grpId="1" nodeType="withEffect">
-                                  <p:stCondLst>
-                                    <p:cond delay="0"/>
-                                  </p:stCondLst>
-                                  <p:childTnLst>
-                                    <p:set>
-                                      <p:cBhvr>
-                                        <p:cTn id="17" dur="1" fill="hold">
-                                          <p:stCondLst>
-                                            <p:cond delay="0"/>
-                                          </p:stCondLst>
-                                        </p:cTn>
-                                        <p:tgtEl>
-                                          <p:spTgt spid="11"/>
-                                        </p:tgtEl>
-                                        <p:attrNameLst>
-                                          <p:attrName>style.visibility</p:attrName>
-                                        </p:attrNameLst>
-                                      </p:cBhvr>
-                                      <p:to>
-                                        <p:strVal val="hidden"/>
-                                      </p:to>
-                                    </p:set>
-                                  </p:childTnLst>
-                                </p:cTn>
-                              </p:par>
-                              <p:par>
-                                <p:cTn id="18" presetID="9" presetClass="exit" presetSubtype="0" fill="hold" nodeType="withEffect">
+                                <p:cTn id="16" presetID="9" presetClass="exit" presetSubtype="0" fill="hold" nodeType="clickEffect">
                                   <p:stCondLst>
                                     <p:cond delay="0"/>
                                   </p:stCondLst>
                                   <p:childTnLst>
                                     <p:animEffect transition="out" filter="dissolve">
                                       <p:cBhvr>
-                                        <p:cTn id="19" dur="500"/>
+                                        <p:cTn id="17" dur="500"/>
                                         <p:tgtEl>
                                           <p:spTgt spid="19"/>
                                         </p:tgtEl>
@@ -13533,7 +13781,7 @@
                                     </p:animEffect>
                                     <p:set>
                                       <p:cBhvr>
-                                        <p:cTn id="20" dur="1" fill="hold">
+                                        <p:cTn id="18" dur="1" fill="hold">
                                           <p:stCondLst>
                                             <p:cond delay="499"/>
                                           </p:stCondLst>
@@ -13553,14 +13801,84 @@
                                 </p:cTn>
                               </p:par>
                               <p:par>
-                                <p:cTn id="21" presetID="9" presetClass="entr" presetSubtype="0" fill="hold" grpId="0" nodeType="withEffect">
+                                <p:cTn id="19" presetID="3" presetClass="exit" presetSubtype="10" fill="hold" grpId="1" nodeType="withEffect">
+                                  <p:stCondLst>
+                                    <p:cond delay="0"/>
+                                  </p:stCondLst>
+                                  <p:childTnLst>
+                                    <p:animEffect transition="out" filter="blinds(horizontal)">
+                                      <p:cBhvr>
+                                        <p:cTn id="20" dur="500"/>
+                                        <p:tgtEl>
+                                          <p:spTgt spid="4"/>
+                                        </p:tgtEl>
+                                      </p:cBhvr>
+                                    </p:animEffect>
+                                    <p:set>
+                                      <p:cBhvr>
+                                        <p:cTn id="21" dur="1" fill="hold">
+                                          <p:stCondLst>
+                                            <p:cond delay="499"/>
+                                          </p:stCondLst>
+                                        </p:cTn>
+                                        <p:tgtEl>
+                                          <p:spTgt spid="4"/>
+                                        </p:tgtEl>
+                                        <p:attrNameLst>
+                                          <p:attrName>style.visibility</p:attrName>
+                                        </p:attrNameLst>
+                                      </p:cBhvr>
+                                      <p:to>
+                                        <p:strVal val="hidden"/>
+                                      </p:to>
+                                    </p:set>
+                                  </p:childTnLst>
+                                </p:cTn>
+                              </p:par>
+                              <p:par>
+                                <p:cTn id="22" presetID="3" presetClass="exit" presetSubtype="10" fill="hold" grpId="1" nodeType="withEffect">
+                                  <p:stCondLst>
+                                    <p:cond delay="0"/>
+                                  </p:stCondLst>
+                                  <p:childTnLst>
+                                    <p:animEffect transition="out" filter="blinds(horizontal)">
+                                      <p:cBhvr>
+                                        <p:cTn id="23" dur="500"/>
+                                        <p:tgtEl>
+                                          <p:spTgt spid="16"/>
+                                        </p:tgtEl>
+                                      </p:cBhvr>
+                                    </p:animEffect>
+                                    <p:set>
+                                      <p:cBhvr>
+                                        <p:cTn id="24" dur="1" fill="hold">
+                                          <p:stCondLst>
+                                            <p:cond delay="499"/>
+                                          </p:stCondLst>
+                                        </p:cTn>
+                                        <p:tgtEl>
+                                          <p:spTgt spid="16"/>
+                                        </p:tgtEl>
+                                        <p:attrNameLst>
+                                          <p:attrName>style.visibility</p:attrName>
+                                        </p:attrNameLst>
+                                      </p:cBhvr>
+                                      <p:to>
+                                        <p:strVal val="hidden"/>
+                                      </p:to>
+                                    </p:set>
+                                  </p:childTnLst>
+                                </p:cTn>
+                              </p:par>
+                              <p:par>
+                                <p:cTn id="25" presetID="9" presetClass="entr" presetSubtype="0" fill="hold" grpId="0" nodeType="withEffect">
                                   <p:stCondLst>
                                     <p:cond delay="0"/>
                                   </p:stCondLst>
                                   <p:childTnLst>
                                     <p:set>
                                       <p:cBhvr>
-                                        <p:cTn id="22" dur="1" fill="hold">
+                                        <p:cTn id="26" dur="1" fill="hold">
                                           <p:stCondLst>
                                             <p:cond delay="0"/>
                                           </p:stCondLst>
@@ -13578,7 +13896,7 @@
                                     </p:set>
                                     <p:animEffect transition="in" filter="dissolve">
                                       <p:cBhvr>
-                                        <p:cTn id="23" dur="500"/>
+                                        <p:cTn id="27" dur="500"/>
                                         <p:tgtEl>
                                           <p:spTgt spid="12"/>
                                         </p:tgtEl>
@@ -13588,14 +13906,14 @@
                                 </p:cTn>
                               </p:par>
                               <p:par>
-                                <p:cTn id="24" presetID="9" presetClass="entr" presetSubtype="0" fill="hold" grpId="0" nodeType="withEffect">
+                                <p:cTn id="28" presetID="9" presetClass="entr" presetSubtype="0" fill="hold" grpId="0" nodeType="withEffect">
                                   <p:stCondLst>
                                     <p:cond delay="0"/>
                                   </p:stCondLst>
                                   <p:childTnLst>
                                     <p:set>
                                       <p:cBhvr>
-                                        <p:cTn id="25" dur="1" fill="hold">
+                                        <p:cTn id="29" dur="1" fill="hold">
                                           <p:stCondLst>
                                             <p:cond delay="0"/>
                                           </p:stCondLst>
@@ -13613,7 +13931,7 @@
                                     </p:set>
                                     <p:animEffect transition="in" filter="dissolve">
                                       <p:cBhvr>
-                                        <p:cTn id="26" dur="500"/>
+                                        <p:cTn id="30" dur="500"/>
                                         <p:tgtEl>
                                           <p:spTgt spid="13"/>
                                         </p:tgtEl>
@@ -13623,14 +13941,14 @@
                                 </p:cTn>
                               </p:par>
                               <p:par>
-                                <p:cTn id="27" presetID="1" presetClass="entr" presetSubtype="0" fill="hold" nodeType="withEffect">
+                                <p:cTn id="31" presetID="1" presetClass="entr" presetSubtype="0" fill="hold" nodeType="withEffect">
                                   <p:stCondLst>
                                     <p:cond delay="0"/>
                                   </p:stCondLst>
                                   <p:childTnLst>
                                     <p:set>
                                       <p:cBhvr>
-                                        <p:cTn id="28" dur="1" fill="hold">
+                                        <p:cTn id="32" dur="1" fill="hold">
                                           <p:stCondLst>
                                             <p:cond delay="0"/>
                                           </p:stCondLst>
@@ -13656,26 +13974,26 @@
                     </p:cTn>
                   </p:par>
                   <p:par>
-                    <p:cTn id="29" fill="hold">
+                    <p:cTn id="33" fill="hold">
                       <p:stCondLst>
                         <p:cond delay="indefinite"/>
                       </p:stCondLst>
                       <p:childTnLst>
                         <p:par>
-                          <p:cTn id="30" fill="hold">
+                          <p:cTn id="34" fill="hold">
                             <p:stCondLst>
                               <p:cond delay="0"/>
                             </p:stCondLst>
                             <p:childTnLst>
                               <p:par>
-                                <p:cTn id="31" presetID="22" presetClass="exit" presetSubtype="4" fill="hold" grpId="1" nodeType="clickEffect">
+                                <p:cTn id="35" presetID="22" presetClass="exit" presetSubtype="4" fill="hold" grpId="1" nodeType="clickEffect">
                                   <p:stCondLst>
                                     <p:cond delay="0"/>
                                   </p:stCondLst>
                                   <p:childTnLst>
                                     <p:animEffect transition="out" filter="wipe(down)">
                                       <p:cBhvr>
-                                        <p:cTn id="32" dur="500"/>
+                                        <p:cTn id="36" dur="500"/>
                                         <p:tgtEl>
                                           <p:spTgt spid="12"/>
                                         </p:tgtEl>
@@ -13683,7 +14001,7 @@
                                     </p:animEffect>
                                     <p:set>
                                       <p:cBhvr>
-                                        <p:cTn id="33" dur="1" fill="hold">
+                                        <p:cTn id="37" dur="1" fill="hold">
                                           <p:stCondLst>
                                             <p:cond delay="499"/>
                                           </p:stCondLst>
@@ -13703,14 +14021,14 @@
                                 </p:cTn>
                               </p:par>
                               <p:par>
-                                <p:cTn id="34" presetID="22" presetClass="exit" presetSubtype="4" fill="hold" grpId="1" nodeType="withEffect">
+                                <p:cTn id="38" presetID="22" presetClass="exit" presetSubtype="4" fill="hold" grpId="1" nodeType="withEffect">
                                   <p:stCondLst>
                                     <p:cond delay="0"/>
                                   </p:stCondLst>
                                   <p:childTnLst>
                                     <p:animEffect transition="out" filter="wipe(down)">
                                       <p:cBhvr>
-                                        <p:cTn id="35" dur="500"/>
+                                        <p:cTn id="39" dur="500"/>
                                         <p:tgtEl>
                                           <p:spTgt spid="13"/>
                                         </p:tgtEl>
@@ -13718,7 +14036,7 @@
                                     </p:animEffect>
                                     <p:set>
                                       <p:cBhvr>
-                                        <p:cTn id="36" dur="1" fill="hold">
+                                        <p:cTn id="40" dur="1" fill="hold">
                                           <p:stCondLst>
                                             <p:cond delay="499"/>
                                           </p:stCondLst>
@@ -13738,14 +14056,14 @@
                                 </p:cTn>
                               </p:par>
                               <p:par>
-                                <p:cTn id="37" presetID="1" presetClass="exit" presetSubtype="0" fill="hold" nodeType="withEffect">
+                                <p:cTn id="41" presetID="1" presetClass="exit" presetSubtype="0" fill="hold" nodeType="withEffect">
                                   <p:stCondLst>
                                     <p:cond delay="0"/>
                                   </p:stCondLst>
                                   <p:childTnLst>
                                     <p:set>
                                       <p:cBhvr>
-                                        <p:cTn id="38" dur="1" fill="hold">
+                                        <p:cTn id="42" dur="1" fill="hold">
                                           <p:stCondLst>
                                             <p:cond delay="0"/>
                                           </p:stCondLst>
@@ -13765,14 +14083,14 @@
                                 </p:cTn>
                               </p:par>
                               <p:par>
-                                <p:cTn id="39" presetID="18" presetClass="entr" presetSubtype="12" fill="hold" grpId="0" nodeType="withEffect">
+                                <p:cTn id="43" presetID="18" presetClass="entr" presetSubtype="12" fill="hold" grpId="0" nodeType="withEffect">
                                   <p:stCondLst>
                                     <p:cond delay="0"/>
                                   </p:stCondLst>
                                   <p:childTnLst>
                                     <p:set>
                                       <p:cBhvr>
-                                        <p:cTn id="40" dur="1" fill="hold">
+                                        <p:cTn id="44" dur="1" fill="hold">
                                           <p:stCondLst>
                                             <p:cond delay="0"/>
                                           </p:stCondLst>
@@ -13790,7 +14108,7 @@
                                     </p:set>
                                     <p:animEffect transition="in" filter="strips(downLeft)">
                                       <p:cBhvr>
-                                        <p:cTn id="41" dur="500"/>
+                                        <p:cTn id="45" dur="500"/>
                                         <p:tgtEl>
                                           <p:spTgt spid="15"/>
                                         </p:tgtEl>
@@ -13800,14 +14118,14 @@
                                 </p:cTn>
                               </p:par>
                               <p:par>
-                                <p:cTn id="42" presetID="18" presetClass="entr" presetSubtype="12" fill="hold" grpId="0" nodeType="withEffect">
+                                <p:cTn id="46" presetID="18" presetClass="entr" presetSubtype="12" fill="hold" grpId="0" nodeType="withEffect">
                                   <p:stCondLst>
                                     <p:cond delay="0"/>
                                   </p:stCondLst>
                                   <p:childTnLst>
                                     <p:set>
                                       <p:cBhvr>
-                                        <p:cTn id="43" dur="1" fill="hold">
+                                        <p:cTn id="47" dur="1" fill="hold">
                                           <p:stCondLst>
                                             <p:cond delay="0"/>
                                           </p:stCondLst>
@@ -13825,7 +14143,7 @@
                                     </p:set>
                                     <p:animEffect transition="in" filter="strips(downLeft)">
                                       <p:cBhvr>
-                                        <p:cTn id="44" dur="500"/>
+                                        <p:cTn id="48" dur="500"/>
                                         <p:tgtEl>
                                           <p:spTgt spid="17"/>
                                         </p:tgtEl>
@@ -13835,14 +14153,14 @@
                                 </p:cTn>
                               </p:par>
                               <p:par>
-                                <p:cTn id="45" presetID="12" presetClass="entr" presetSubtype="4" fill="hold" nodeType="withEffect">
+                                <p:cTn id="49" presetID="12" presetClass="entr" presetSubtype="4" fill="hold" nodeType="withEffect">
                                   <p:stCondLst>
                                     <p:cond delay="0"/>
                                   </p:stCondLst>
                                   <p:childTnLst>
                                     <p:set>
                                       <p:cBhvr>
-                                        <p:cTn id="46" dur="1" fill="hold">
+                                        <p:cTn id="50" dur="1" fill="hold">
                                           <p:stCondLst>
                                             <p:cond delay="0"/>
                                           </p:stCondLst>
@@ -13860,7 +14178,7 @@
                                     </p:set>
                                     <p:anim calcmode="lin" valueType="num">
                                       <p:cBhvr additive="base">
-                                        <p:cTn id="47" dur="500"/>
+                                        <p:cTn id="51" dur="500"/>
                                         <p:tgtEl>
                                           <p:spTgt spid="24"/>
                                         </p:tgtEl>
@@ -13883,7 +14201,7 @@
                                     </p:anim>
                                     <p:animEffect transition="in" filter="wipe(up)">
                                       <p:cBhvr>
-                                        <p:cTn id="48" dur="500"/>
+                                        <p:cTn id="52" dur="500"/>
                                         <p:tgtEl>
                                           <p:spTgt spid="24"/>
                                         </p:tgtEl>
@@ -13920,16 +14238,16 @@
       </p:par>
     </p:tnLst>
     <p:bldLst>
-      <p:bldP spid="10" grpId="0" animBg="1"/>
-      <p:bldP spid="10" grpId="1" animBg="1"/>
-      <p:bldP spid="11" grpId="0" animBg="1"/>
-      <p:bldP spid="11" grpId="1" animBg="1"/>
       <p:bldP spid="12" grpId="0" animBg="1"/>
       <p:bldP spid="12" grpId="1" animBg="1"/>
       <p:bldP spid="13" grpId="0" animBg="1"/>
       <p:bldP spid="13" grpId="1" animBg="1"/>
       <p:bldP spid="15" grpId="0" animBg="1"/>
       <p:bldP spid="17" grpId="0" animBg="1"/>
+      <p:bldP spid="4" grpId="0" animBg="1"/>
+      <p:bldP spid="4" grpId="1" animBg="1"/>
+      <p:bldP spid="16" grpId="0" animBg="1"/>
+      <p:bldP spid="16" grpId="1" animBg="1"/>
     </p:bldLst>
   </p:timing>
 </p:sld>
@@ -14293,7 +14611,7 @@
           <p:nvPr/>
         </p:nvPicPr>
         <p:blipFill>
-          <a:blip r:embed="rId2">
+          <a:blip r:embed="rId3">
             <a:extLst>
               <a:ext uri="{28A0092B-C50C-407E-A947-70E740481C1C}">
                 <a14:useLocalDpi xmlns:a14="http://schemas.microsoft.com/office/drawing/2010/main" val="0"/>
@@ -14323,7 +14641,7 @@
           <p:nvPr/>
         </p:nvPicPr>
         <p:blipFill rotWithShape="1">
-          <a:blip r:embed="rId2">
+          <a:blip r:embed="rId3">
             <a:extLst>
               <a:ext uri="{28A0092B-C50C-407E-A947-70E740481C1C}">
                 <a14:useLocalDpi xmlns:a14="http://schemas.microsoft.com/office/drawing/2010/main" val="0"/>
@@ -14352,7 +14670,7 @@
           <p:nvPr/>
         </p:nvPicPr>
         <p:blipFill rotWithShape="1">
-          <a:blip r:embed="rId2">
+          <a:blip r:embed="rId3">
             <a:extLst>
               <a:ext uri="{28A0092B-C50C-407E-A947-70E740481C1C}">
                 <a14:useLocalDpi xmlns:a14="http://schemas.microsoft.com/office/drawing/2010/main" val="0"/>
@@ -14381,7 +14699,7 @@
           <p:nvPr/>
         </p:nvPicPr>
         <p:blipFill rotWithShape="1">
-          <a:blip r:embed="rId2">
+          <a:blip r:embed="rId3">
             <a:extLst>
               <a:ext uri="{28A0092B-C50C-407E-A947-70E740481C1C}">
                 <a14:useLocalDpi xmlns:a14="http://schemas.microsoft.com/office/drawing/2010/main" val="0"/>
@@ -14410,7 +14728,7 @@
           <p:nvPr/>
         </p:nvPicPr>
         <p:blipFill rotWithShape="1">
-          <a:blip r:embed="rId2">
+          <a:blip r:embed="rId3">
             <a:extLst>
               <a:ext uri="{28A0092B-C50C-407E-A947-70E740481C1C}">
                 <a14:useLocalDpi xmlns:a14="http://schemas.microsoft.com/office/drawing/2010/main" val="0"/>
@@ -14439,7 +14757,7 @@
           <p:nvPr/>
         </p:nvPicPr>
         <p:blipFill rotWithShape="1">
-          <a:blip r:embed="rId3">
+          <a:blip r:embed="rId4">
             <a:extLst>
               <a:ext uri="{28A0092B-C50C-407E-A947-70E740481C1C}">
                 <a14:useLocalDpi xmlns:a14="http://schemas.microsoft.com/office/drawing/2010/main" val="0"/>
@@ -14468,7 +14786,7 @@
           <p:nvPr/>
         </p:nvPicPr>
         <p:blipFill rotWithShape="1">
-          <a:blip r:embed="rId3">
+          <a:blip r:embed="rId4">
             <a:extLst>
               <a:ext uri="{28A0092B-C50C-407E-A947-70E740481C1C}">
                 <a14:useLocalDpi xmlns:a14="http://schemas.microsoft.com/office/drawing/2010/main" val="0"/>
@@ -14497,7 +14815,7 @@
           <p:nvPr/>
         </p:nvPicPr>
         <p:blipFill>
-          <a:blip r:embed="rId3">
+          <a:blip r:embed="rId4">
             <a:extLst>
               <a:ext uri="{28A0092B-C50C-407E-A947-70E740481C1C}">
                 <a14:useLocalDpi xmlns:a14="http://schemas.microsoft.com/office/drawing/2010/main" val="0"/>
@@ -15414,30 +15732,102 @@
                             </p:childTnLst>
                           </p:cTn>
                         </p:par>
+                        <p:par>
+                          <p:cTn id="7" fill="hold">
+                            <p:stCondLst>
+                              <p:cond delay="0"/>
+                            </p:stCondLst>
+                            <p:childTnLst>
+                              <p:par>
+                                <p:cTn id="8" presetID="1" presetClass="entr" presetSubtype="0" fill="hold" nodeType="afterEffect">
+                                  <p:stCondLst>
+                                    <p:cond delay="500"/>
+                                  </p:stCondLst>
+                                  <p:childTnLst>
+                                    <p:set>
+                                      <p:cBhvr>
+                                        <p:cTn id="9" dur="1" fill="hold">
+                                          <p:stCondLst>
+                                            <p:cond delay="0"/>
+                                          </p:stCondLst>
+                                        </p:cTn>
+                                        <p:tgtEl>
+                                          <p:spTgt spid="10"/>
+                                        </p:tgtEl>
+                                        <p:attrNameLst>
+                                          <p:attrName>style.visibility</p:attrName>
+                                        </p:attrNameLst>
+                                      </p:cBhvr>
+                                      <p:to>
+                                        <p:strVal val="visible"/>
+                                      </p:to>
+                                    </p:set>
+                                  </p:childTnLst>
+                                </p:cTn>
+                              </p:par>
+                            </p:childTnLst>
+                          </p:cTn>
+                        </p:par>
+                        <p:par>
+                          <p:cTn id="10" fill="hold">
+                            <p:stCondLst>
+                              <p:cond delay="500"/>
+                            </p:stCondLst>
+                            <p:childTnLst>
+                              <p:par>
+                                <p:cTn id="11" presetID="1" presetClass="entr" presetSubtype="0" fill="hold" nodeType="afterEffect">
+                                  <p:stCondLst>
+                                    <p:cond delay="500"/>
+                                  </p:stCondLst>
+                                  <p:childTnLst>
+                                    <p:set>
+                                      <p:cBhvr>
+                                        <p:cTn id="12" dur="1" fill="hold">
+                                          <p:stCondLst>
+                                            <p:cond delay="0"/>
+                                          </p:stCondLst>
+                                        </p:cTn>
+                                        <p:tgtEl>
+                                          <p:spTgt spid="11"/>
+                                        </p:tgtEl>
+                                        <p:attrNameLst>
+                                          <p:attrName>style.visibility</p:attrName>
+                                        </p:attrNameLst>
+                                      </p:cBhvr>
+                                      <p:to>
+                                        <p:strVal val="visible"/>
+                                      </p:to>
+                                    </p:set>
+                                  </p:childTnLst>
+                                </p:cTn>
+                              </p:par>
+                            </p:childTnLst>
+                          </p:cTn>
+                        </p:par>
                       </p:childTnLst>
                     </p:cTn>
                   </p:par>
                   <p:par>
-                    <p:cTn id="7" fill="hold">
+                    <p:cTn id="13" fill="hold">
                       <p:stCondLst>
                         <p:cond delay="indefinite"/>
                       </p:stCondLst>
                       <p:childTnLst>
                         <p:par>
-                          <p:cTn id="8" fill="hold">
+                          <p:cTn id="14" fill="hold">
                             <p:stCondLst>
                               <p:cond delay="0"/>
                             </p:stCondLst>
                             <p:childTnLst>
                               <p:par>
-                                <p:cTn id="9" presetID="9" presetClass="entr" presetSubtype="0" fill="hold" grpId="0" nodeType="clickEffect">
+                                <p:cTn id="15" presetID="9" presetClass="entr" presetSubtype="0" fill="hold" grpId="0" nodeType="clickEffect">
                                   <p:stCondLst>
                                     <p:cond delay="0"/>
                                   </p:stCondLst>
                                   <p:childTnLst>
                                     <p:set>
                                       <p:cBhvr>
-                                        <p:cTn id="10" dur="1" fill="hold">
+                                        <p:cTn id="16" dur="1" fill="hold">
                                           <p:stCondLst>
                                             <p:cond delay="0"/>
                                           </p:stCondLst>
@@ -15455,7 +15845,7 @@
                                     </p:set>
                                     <p:animEffect transition="in" filter="dissolve">
                                       <p:cBhvr>
-                                        <p:cTn id="11" dur="500"/>
+                                        <p:cTn id="17" dur="500"/>
                                         <p:tgtEl>
                                           <p:spTgt spid="50"/>
                                         </p:tgtEl>
@@ -15465,14 +15855,77 @@
                                 </p:cTn>
                               </p:par>
                               <p:par>
-                                <p:cTn id="12" presetID="9" presetClass="entr" presetSubtype="0" fill="hold" grpId="0" nodeType="withEffect">
+                                <p:cTn id="18" presetID="1" presetClass="entr" presetSubtype="0" fill="hold" nodeType="withEffect">
                                   <p:stCondLst>
                                     <p:cond delay="0"/>
                                   </p:stCondLst>
                                   <p:childTnLst>
                                     <p:set>
                                       <p:cBhvr>
-                                        <p:cTn id="13" dur="1" fill="hold">
+                                        <p:cTn id="19" dur="1" fill="hold">
+                                          <p:stCondLst>
+                                            <p:cond delay="0"/>
+                                          </p:stCondLst>
+                                        </p:cTn>
+                                        <p:tgtEl>
+                                          <p:spTgt spid="12"/>
+                                        </p:tgtEl>
+                                        <p:attrNameLst>
+                                          <p:attrName>style.visibility</p:attrName>
+                                        </p:attrNameLst>
+                                      </p:cBhvr>
+                                      <p:to>
+                                        <p:strVal val="visible"/>
+                                      </p:to>
+                                    </p:set>
+                                  </p:childTnLst>
+                                </p:cTn>
+                              </p:par>
+                              <p:par>
+                                <p:cTn id="20" presetID="1" presetClass="entr" presetSubtype="0" fill="hold" nodeType="withEffect">
+                                  <p:stCondLst>
+                                    <p:cond delay="0"/>
+                                  </p:stCondLst>
+                                  <p:childTnLst>
+                                    <p:set>
+                                      <p:cBhvr>
+                                        <p:cTn id="21" dur="1" fill="hold">
+                                          <p:stCondLst>
+                                            <p:cond delay="0"/>
+                                          </p:stCondLst>
+                                        </p:cTn>
+                                        <p:tgtEl>
+                                          <p:spTgt spid="13"/>
+                                        </p:tgtEl>
+                                        <p:attrNameLst>
+                                          <p:attrName>style.visibility</p:attrName>
+                                        </p:attrNameLst>
+                                      </p:cBhvr>
+                                      <p:to>
+                                        <p:strVal val="visible"/>
+                                      </p:to>
+                                    </p:set>
+                                  </p:childTnLst>
+                                </p:cTn>
+                              </p:par>
+                            </p:childTnLst>
+                          </p:cTn>
+                        </p:par>
+                        <p:par>
+                          <p:cTn id="22" fill="hold">
+                            <p:stCondLst>
+                              <p:cond delay="500"/>
+                            </p:stCondLst>
+                            <p:childTnLst>
+                              <p:par>
+                                <p:cTn id="23" presetID="9" presetClass="entr" presetSubtype="0" fill="hold" grpId="0" nodeType="afterEffect">
+                                  <p:stCondLst>
+                                    <p:cond delay="0"/>
+                                  </p:stCondLst>
+                                  <p:childTnLst>
+                                    <p:set>
+                                      <p:cBhvr>
+                                        <p:cTn id="24" dur="1" fill="hold">
                                           <p:stCondLst>
                                             <p:cond delay="0"/>
                                           </p:stCondLst>
@@ -15490,7 +15943,7 @@
                                     </p:set>
                                     <p:animEffect transition="in" filter="dissolve">
                                       <p:cBhvr>
-                                        <p:cTn id="14" dur="500"/>
+                                        <p:cTn id="25" dur="500"/>
                                         <p:tgtEl>
                                           <p:spTgt spid="52"/>
                                         </p:tgtEl>
@@ -15499,15 +15952,24 @@
                                   </p:childTnLst>
                                 </p:cTn>
                               </p:par>
+                            </p:childTnLst>
+                          </p:cTn>
+                        </p:par>
+                        <p:par>
+                          <p:cTn id="26" fill="hold">
+                            <p:stCondLst>
+                              <p:cond delay="1000"/>
+                            </p:stCondLst>
+                            <p:childTnLst>
                               <p:par>
-                                <p:cTn id="15" presetID="9" presetClass="entr" presetSubtype="0" fill="hold" grpId="0" nodeType="withEffect">
+                                <p:cTn id="27" presetID="9" presetClass="entr" presetSubtype="0" fill="hold" grpId="0" nodeType="afterEffect">
                                   <p:stCondLst>
                                     <p:cond delay="0"/>
                                   </p:stCondLst>
                                   <p:childTnLst>
                                     <p:set>
                                       <p:cBhvr>
-                                        <p:cTn id="16" dur="1" fill="hold">
+                                        <p:cTn id="28" dur="1" fill="hold">
                                           <p:stCondLst>
                                             <p:cond delay="0"/>
                                           </p:stCondLst>
@@ -15525,7 +15987,7 @@
                                     </p:set>
                                     <p:animEffect transition="in" filter="dissolve">
                                       <p:cBhvr>
-                                        <p:cTn id="17" dur="500"/>
+                                        <p:cTn id="29" dur="500"/>
                                         <p:tgtEl>
                                           <p:spTgt spid="54"/>
                                         </p:tgtEl>
@@ -15534,15 +15996,24 @@
                                   </p:childTnLst>
                                 </p:cTn>
                               </p:par>
+                            </p:childTnLst>
+                          </p:cTn>
+                        </p:par>
+                        <p:par>
+                          <p:cTn id="30" fill="hold">
+                            <p:stCondLst>
+                              <p:cond delay="1500"/>
+                            </p:stCondLst>
+                            <p:childTnLst>
                               <p:par>
-                                <p:cTn id="18" presetID="9" presetClass="entr" presetSubtype="0" fill="hold" grpId="0" nodeType="withEffect">
+                                <p:cTn id="31" presetID="9" presetClass="entr" presetSubtype="0" fill="hold" grpId="0" nodeType="afterEffect">
                                   <p:stCondLst>
                                     <p:cond delay="0"/>
                                   </p:stCondLst>
                                   <p:childTnLst>
                                     <p:set>
                                       <p:cBhvr>
-                                        <p:cTn id="19" dur="1" fill="hold">
+                                        <p:cTn id="32" dur="1" fill="hold">
                                           <p:stCondLst>
                                             <p:cond delay="0"/>
                                           </p:stCondLst>
@@ -15560,7 +16031,7 @@
                                     </p:set>
                                     <p:animEffect transition="in" filter="dissolve">
                                       <p:cBhvr>
-                                        <p:cTn id="20" dur="500"/>
+                                        <p:cTn id="33" dur="500"/>
                                         <p:tgtEl>
                                           <p:spTgt spid="57"/>
                                         </p:tgtEl>
@@ -15569,15 +16040,24 @@
                                   </p:childTnLst>
                                 </p:cTn>
                               </p:par>
+                            </p:childTnLst>
+                          </p:cTn>
+                        </p:par>
+                        <p:par>
+                          <p:cTn id="34" fill="hold">
+                            <p:stCondLst>
+                              <p:cond delay="2000"/>
+                            </p:stCondLst>
+                            <p:childTnLst>
                               <p:par>
-                                <p:cTn id="21" presetID="9" presetClass="entr" presetSubtype="0" fill="hold" grpId="0" nodeType="withEffect">
+                                <p:cTn id="35" presetID="9" presetClass="entr" presetSubtype="0" fill="hold" grpId="0" nodeType="afterEffect">
                                   <p:stCondLst>
                                     <p:cond delay="0"/>
                                   </p:stCondLst>
                                   <p:childTnLst>
                                     <p:set>
                                       <p:cBhvr>
-                                        <p:cTn id="22" dur="1" fill="hold">
+                                        <p:cTn id="36" dur="1" fill="hold">
                                           <p:stCondLst>
                                             <p:cond delay="0"/>
                                           </p:stCondLst>
@@ -15595,7 +16075,7 @@
                                     </p:set>
                                     <p:animEffect transition="in" filter="dissolve">
                                       <p:cBhvr>
-                                        <p:cTn id="23" dur="500"/>
+                                        <p:cTn id="37" dur="500"/>
                                         <p:tgtEl>
                                           <p:spTgt spid="58"/>
                                         </p:tgtEl>
@@ -15604,15 +16084,24 @@
                                   </p:childTnLst>
                                 </p:cTn>
                               </p:par>
+                            </p:childTnLst>
+                          </p:cTn>
+                        </p:par>
+                        <p:par>
+                          <p:cTn id="38" fill="hold">
+                            <p:stCondLst>
+                              <p:cond delay="2500"/>
+                            </p:stCondLst>
+                            <p:childTnLst>
                               <p:par>
-                                <p:cTn id="24" presetID="9" presetClass="entr" presetSubtype="0" fill="hold" grpId="0" nodeType="withEffect">
+                                <p:cTn id="39" presetID="9" presetClass="entr" presetSubtype="0" fill="hold" grpId="0" nodeType="afterEffect">
                                   <p:stCondLst>
                                     <p:cond delay="0"/>
                                   </p:stCondLst>
                                   <p:childTnLst>
                                     <p:set>
                                       <p:cBhvr>
-                                        <p:cTn id="25" dur="1" fill="hold">
+                                        <p:cTn id="40" dur="1" fill="hold">
                                           <p:stCondLst>
                                             <p:cond delay="0"/>
                                           </p:stCondLst>
@@ -15630,7 +16119,7 @@
                                     </p:set>
                                     <p:animEffect transition="in" filter="dissolve">
                                       <p:cBhvr>
-                                        <p:cTn id="26" dur="500"/>
+                                        <p:cTn id="41" dur="500"/>
                                         <p:tgtEl>
                                           <p:spTgt spid="60"/>
                                         </p:tgtEl>
@@ -15639,15 +16128,24 @@
                                   </p:childTnLst>
                                 </p:cTn>
                               </p:par>
+                            </p:childTnLst>
+                          </p:cTn>
+                        </p:par>
+                        <p:par>
+                          <p:cTn id="42" fill="hold">
+                            <p:stCondLst>
+                              <p:cond delay="3000"/>
+                            </p:stCondLst>
+                            <p:childTnLst>
                               <p:par>
-                                <p:cTn id="27" presetID="9" presetClass="entr" presetSubtype="0" fill="hold" grpId="0" nodeType="withEffect">
+                                <p:cTn id="43" presetID="9" presetClass="entr" presetSubtype="0" fill="hold" grpId="0" nodeType="afterEffect">
                                   <p:stCondLst>
                                     <p:cond delay="0"/>
                                   </p:stCondLst>
                                   <p:childTnLst>
                                     <p:set>
                                       <p:cBhvr>
-                                        <p:cTn id="28" dur="1" fill="hold">
+                                        <p:cTn id="44" dur="1" fill="hold">
                                           <p:stCondLst>
                                             <p:cond delay="0"/>
                                           </p:stCondLst>
@@ -15665,7 +16163,7 @@
                                     </p:set>
                                     <p:animEffect transition="in" filter="dissolve">
                                       <p:cBhvr>
-                                        <p:cTn id="29" dur="500"/>
+                                        <p:cTn id="45" dur="500"/>
                                         <p:tgtEl>
                                           <p:spTgt spid="62"/>
                                         </p:tgtEl>
@@ -15681,26 +16179,26 @@
                     </p:cTn>
                   </p:par>
                   <p:par>
-                    <p:cTn id="30" fill="hold">
+                    <p:cTn id="46" fill="hold">
                       <p:stCondLst>
                         <p:cond delay="indefinite"/>
                       </p:stCondLst>
                       <p:childTnLst>
                         <p:par>
-                          <p:cTn id="31" fill="hold">
+                          <p:cTn id="47" fill="hold">
                             <p:stCondLst>
                               <p:cond delay="0"/>
                             </p:stCondLst>
                             <p:childTnLst>
                               <p:par>
-                                <p:cTn id="32" presetID="3" presetClass="entr" presetSubtype="10" fill="hold" grpId="0" nodeType="clickEffect">
+                                <p:cTn id="48" presetID="3" presetClass="entr" presetSubtype="10" fill="hold" grpId="0" nodeType="clickEffect">
                                   <p:stCondLst>
                                     <p:cond delay="0"/>
                                   </p:stCondLst>
                                   <p:childTnLst>
                                     <p:set>
                                       <p:cBhvr>
-                                        <p:cTn id="33" dur="1" fill="hold">
+                                        <p:cTn id="49" dur="1" fill="hold">
                                           <p:stCondLst>
                                             <p:cond delay="0"/>
                                           </p:stCondLst>
@@ -15718,9 +16216,79 @@
                                     </p:set>
                                     <p:animEffect transition="in" filter="blinds(horizontal)">
                                       <p:cBhvr>
-                                        <p:cTn id="34" dur="500"/>
+                                        <p:cTn id="50" dur="500"/>
                                         <p:tgtEl>
                                           <p:spTgt spid="63"/>
+                                        </p:tgtEl>
+                                      </p:cBhvr>
+                                    </p:animEffect>
+                                  </p:childTnLst>
+                                </p:cTn>
+                              </p:par>
+                              <p:par>
+                                <p:cTn id="51" presetID="3" presetClass="entr" presetSubtype="10" fill="hold" nodeType="withEffect">
+                                  <p:stCondLst>
+                                    <p:cond delay="0"/>
+                                  </p:stCondLst>
+                                  <p:childTnLst>
+                                    <p:set>
+                                      <p:cBhvr>
+                                        <p:cTn id="52" dur="1" fill="hold">
+                                          <p:stCondLst>
+                                            <p:cond delay="0"/>
+                                          </p:stCondLst>
+                                        </p:cTn>
+                                        <p:tgtEl>
+                                          <p:spTgt spid="5"/>
+                                        </p:tgtEl>
+                                        <p:attrNameLst>
+                                          <p:attrName>style.visibility</p:attrName>
+                                        </p:attrNameLst>
+                                      </p:cBhvr>
+                                      <p:to>
+                                        <p:strVal val="visible"/>
+                                      </p:to>
+                                    </p:set>
+                                    <p:animEffect transition="in" filter="blinds(horizontal)">
+                                      <p:cBhvr>
+                                        <p:cTn id="53" dur="500"/>
+                                        <p:tgtEl>
+                                          <p:spTgt spid="5"/>
+                                        </p:tgtEl>
+                                      </p:cBhvr>
+                                    </p:animEffect>
+                                  </p:childTnLst>
+                                </p:cTn>
+                              </p:par>
+                              <p:par>
+                                <p:cTn id="54" presetID="3" presetClass="entr" presetSubtype="10" fill="hold" nodeType="withEffect">
+                                  <p:stCondLst>
+                                    <p:cond delay="0"/>
+                                  </p:stCondLst>
+                                  <p:childTnLst>
+                                    <p:set>
+                                      <p:cBhvr>
+                                        <p:cTn id="55" dur="1" fill="hold">
+                                          <p:stCondLst>
+                                            <p:cond delay="0"/>
+                                          </p:stCondLst>
+                                        </p:cTn>
+                                        <p:tgtEl>
+                                          <p:spTgt spid="14"/>
+                                        </p:tgtEl>
+                                        <p:attrNameLst>
+                                          <p:attrName>style.visibility</p:attrName>
+                                        </p:attrNameLst>
+                                      </p:cBhvr>
+                                      <p:to>
+                                        <p:strVal val="visible"/>
+                                      </p:to>
+                                    </p:set>
+                                    <p:animEffect transition="in" filter="blinds(horizontal)">
+                                      <p:cBhvr>
+                                        <p:cTn id="56" dur="500"/>
+                                        <p:tgtEl>
+                                          <p:spTgt spid="14"/>
                                         </p:tgtEl>
                                       </p:cBhvr>
                                     </p:animEffect>
@@ -15730,30 +16298,21 @@
                             </p:childTnLst>
                           </p:cTn>
                         </p:par>
-                      </p:childTnLst>
-                    </p:cTn>
-                  </p:par>
-                  <p:par>
-                    <p:cTn id="35" fill="hold">
-                      <p:stCondLst>
-                        <p:cond delay="indefinite"/>
-                      </p:stCondLst>
-                      <p:childTnLst>
                         <p:par>
-                          <p:cTn id="36" fill="hold">
+                          <p:cTn id="57" fill="hold">
                             <p:stCondLst>
-                              <p:cond delay="0"/>
+                              <p:cond delay="500"/>
                             </p:stCondLst>
                             <p:childTnLst>
                               <p:par>
-                                <p:cTn id="37" presetID="18" presetClass="entr" presetSubtype="12" fill="hold" grpId="0" nodeType="clickEffect">
+                                <p:cTn id="58" presetID="18" presetClass="entr" presetSubtype="12" fill="hold" grpId="0" nodeType="afterEffect">
                                   <p:stCondLst>
                                     <p:cond delay="0"/>
                                   </p:stCondLst>
                                   <p:childTnLst>
                                     <p:set>
                                       <p:cBhvr>
-                                        <p:cTn id="38" dur="1" fill="hold">
+                                        <p:cTn id="59" dur="1" fill="hold">
                                           <p:stCondLst>
                                             <p:cond delay="0"/>
                                           </p:stCondLst>
@@ -15771,7 +16330,7 @@
                                     </p:set>
                                     <p:animEffect transition="in" filter="strips(downLeft)">
                                       <p:cBhvr>
-                                        <p:cTn id="39" dur="500"/>
+                                        <p:cTn id="60" dur="500"/>
                                         <p:tgtEl>
                                           <p:spTgt spid="64"/>
                                         </p:tgtEl>
@@ -19560,8 +20119,8 @@
         </p:nvSpPr>
         <p:spPr>
           <a:xfrm>
-            <a:off x="1171575" y="1585913"/>
-            <a:ext cx="10820400" cy="4424362"/>
+            <a:off x="2462463" y="2161674"/>
+            <a:ext cx="8918909" cy="3034213"/>
           </a:xfrm>
         </p:spPr>
         <p:txBody>
@@ -19571,28 +20130,28 @@
           <a:lstStyle/>
           <a:p>
             <a:r>
-              <a:rPr lang="en-US" altLang="zh-TW" sz="3200" dirty="0"/>
+              <a:rPr lang="zh-TW" altLang="en-US" sz="2800" dirty="0" smtClean="0"/>
+              <a:t> </a:t>
+            </a:r>
+            <a:r>
+              <a:rPr lang="en-US" altLang="zh-TW" sz="2800" dirty="0" smtClean="0"/>
               <a:t>Provide</a:t>
             </a:r>
             <a:r>
-              <a:rPr lang="zh-TW" altLang="en-US" sz="3200" dirty="0"/>
-              <a:t> </a:t>
-            </a:r>
-            <a:r>
-              <a:rPr lang="en-US" altLang="zh-TW" sz="3200" dirty="0"/>
+              <a:rPr lang="zh-TW" altLang="en-US" sz="2800" dirty="0" smtClean="0"/>
+              <a:t> </a:t>
+            </a:r>
+            <a:r>
+              <a:rPr lang="en-US" altLang="zh-TW" sz="2800" dirty="0"/>
               <a:t>a</a:t>
             </a:r>
             <a:r>
-              <a:rPr lang="zh-TW" altLang="en-US" sz="3200" dirty="0"/>
-              <a:t> </a:t>
-            </a:r>
-            <a:r>
-              <a:rPr lang="en-US" altLang="zh-TW" sz="3200" dirty="0"/>
-              <a:t>c</a:t>
+              <a:rPr lang="zh-TW" altLang="en-US" sz="2800" dirty="0"/>
+              <a:t> </a:t>
             </a:r>
             <a:r>
               <a:rPr lang="en-US" altLang="zh-TW" sz="2800" dirty="0"/>
-              <a:t>onvenient</a:t>
+              <a:t>convenient</a:t>
             </a:r>
             <a:r>
               <a:rPr lang="zh-TW" altLang="en-US" sz="2800" dirty="0"/>
@@ -19629,101 +20188,133 @@
           </a:p>
           <a:p>
             <a:r>
-              <a:rPr lang="zh-TW" altLang="en-US" sz="3200" dirty="0"/>
-              <a:t> </a:t>
-            </a:r>
-            <a:r>
-              <a:rPr lang="en-US" altLang="zh-TW" sz="3200" dirty="0"/>
-              <a:t>System</a:t>
-            </a:r>
-            <a:r>
-              <a:rPr lang="zh-TW" altLang="en-US" sz="3200" dirty="0"/>
-              <a:t> </a:t>
-            </a:r>
-            <a:r>
-              <a:rPr lang="en-US" altLang="zh-TW" sz="3200" dirty="0"/>
-              <a:t>is good at practicing and teaching</a:t>
-            </a:r>
-          </a:p>
-          <a:p>
-            <a:endParaRPr lang="en-US" altLang="zh-TW" sz="3200" dirty="0"/>
-          </a:p>
-          <a:p>
-            <a:r>
-              <a:rPr lang="zh-TW" altLang="en-US" sz="3200" dirty="0"/>
-              <a:t> </a:t>
-            </a:r>
-            <a:r>
-              <a:rPr lang="en-US" altLang="zh-TW" sz="3200" dirty="0"/>
+              <a:rPr lang="zh-TW" altLang="en-US" sz="2800" dirty="0" smtClean="0"/>
+              <a:t> </a:t>
+            </a:r>
+            <a:r>
+              <a:rPr lang="en-US" altLang="zh-TW" sz="2800" dirty="0" smtClean="0"/>
+              <a:t>Simplified</a:t>
+            </a:r>
+            <a:r>
+              <a:rPr lang="zh-TW" altLang="en-US" sz="2800" dirty="0" smtClean="0"/>
+              <a:t> </a:t>
+            </a:r>
+            <a:r>
+              <a:rPr lang="en-US" altLang="zh-TW" sz="2800" dirty="0" smtClean="0"/>
+              <a:t>score</a:t>
+            </a:r>
+            <a:r>
+              <a:rPr lang="zh-TW" altLang="en-US" sz="2800" dirty="0" smtClean="0"/>
+              <a:t> </a:t>
+            </a:r>
+            <a:r>
+              <a:rPr lang="en-US" altLang="zh-TW" sz="2800" dirty="0" smtClean="0"/>
+              <a:t>can</a:t>
+            </a:r>
+            <a:r>
+              <a:rPr lang="zh-TW" altLang="en-US" sz="2800" dirty="0" smtClean="0"/>
+              <a:t> </a:t>
+            </a:r>
+            <a:r>
+              <a:rPr lang="en-US" altLang="zh-TW" sz="2800" dirty="0" smtClean="0"/>
+              <a:t>help</a:t>
+            </a:r>
+            <a:r>
+              <a:rPr lang="zh-TW" altLang="en-US" sz="2800" dirty="0" smtClean="0"/>
+              <a:t> </a:t>
+            </a:r>
+            <a:r>
+              <a:rPr lang="en-US" altLang="zh-TW" sz="2800" dirty="0" smtClean="0"/>
+              <a:t>learner</a:t>
+            </a:r>
+            <a:r>
+              <a:rPr lang="zh-TW" altLang="en-US" sz="2800" dirty="0" smtClean="0"/>
+              <a:t> </a:t>
+            </a:r>
+            <a:r>
+              <a:rPr lang="en-US" altLang="zh-TW" sz="2800" dirty="0" smtClean="0"/>
+              <a:t>learning</a:t>
+            </a:r>
+          </a:p>
+          <a:p>
+            <a:endParaRPr lang="en-US" altLang="zh-TW" sz="2800" dirty="0"/>
+          </a:p>
+          <a:p>
+            <a:r>
+              <a:rPr lang="zh-TW" altLang="en-US" sz="2800" dirty="0"/>
+              <a:t> </a:t>
+            </a:r>
+            <a:r>
+              <a:rPr lang="en-US" altLang="zh-TW" sz="2800" dirty="0"/>
               <a:t>Rhythm low-level</a:t>
             </a:r>
             <a:r>
-              <a:rPr lang="zh-TW" altLang="en-US" sz="3200" dirty="0"/>
-              <a:t> </a:t>
-            </a:r>
-            <a:r>
-              <a:rPr lang="en-US" altLang="zh-TW" sz="3200" dirty="0"/>
+              <a:rPr lang="zh-TW" altLang="en-US" sz="2800" dirty="0"/>
+              <a:t> </a:t>
+            </a:r>
+            <a:r>
+              <a:rPr lang="en-US" altLang="zh-TW" sz="2800" dirty="0"/>
               <a:t>is</a:t>
             </a:r>
             <a:r>
-              <a:rPr lang="zh-TW" altLang="en-US" sz="3200" dirty="0"/>
-              <a:t> </a:t>
-            </a:r>
-            <a:r>
-              <a:rPr lang="en-US" altLang="zh-TW" sz="3200" dirty="0"/>
+              <a:rPr lang="zh-TW" altLang="en-US" sz="2800" dirty="0"/>
+              <a:t> </a:t>
+            </a:r>
+            <a:r>
+              <a:rPr lang="en-US" altLang="zh-TW" sz="2800" dirty="0"/>
               <a:t>not</a:t>
             </a:r>
             <a:r>
-              <a:rPr lang="zh-TW" altLang="en-US" sz="3200" dirty="0"/>
-              <a:t> </a:t>
-            </a:r>
-            <a:r>
-              <a:rPr lang="en-US" altLang="zh-TW" sz="3200" dirty="0"/>
+              <a:rPr lang="zh-TW" altLang="en-US" sz="2800" dirty="0"/>
+              <a:t> </a:t>
+            </a:r>
+            <a:r>
+              <a:rPr lang="en-US" altLang="zh-TW" sz="2800" dirty="0"/>
               <a:t>good</a:t>
             </a:r>
           </a:p>
           <a:p>
             <a:r>
-              <a:rPr lang="zh-TW" altLang="en-US" sz="3200" dirty="0"/>
-              <a:t> </a:t>
-            </a:r>
-            <a:r>
-              <a:rPr lang="en-US" altLang="zh-TW" sz="3200" dirty="0"/>
+              <a:rPr lang="zh-TW" altLang="en-US" sz="2800" dirty="0"/>
+              <a:t> </a:t>
+            </a:r>
+            <a:r>
+              <a:rPr lang="en-US" altLang="zh-TW" sz="2800" dirty="0"/>
               <a:t>Simplifying</a:t>
             </a:r>
             <a:r>
-              <a:rPr lang="zh-TW" altLang="en-US" sz="3200" dirty="0"/>
-              <a:t> </a:t>
-            </a:r>
-            <a:r>
-              <a:rPr lang="en-US" altLang="zh-TW" sz="3200" dirty="0"/>
+              <a:rPr lang="zh-TW" altLang="en-US" sz="2800" dirty="0"/>
+              <a:t> </a:t>
+            </a:r>
+            <a:r>
+              <a:rPr lang="en-US" altLang="zh-TW" sz="2800" dirty="0"/>
               <a:t>waste</a:t>
             </a:r>
             <a:r>
-              <a:rPr lang="zh-TW" altLang="en-US" sz="3200" dirty="0"/>
-              <a:t> </a:t>
-            </a:r>
-            <a:r>
-              <a:rPr lang="en-US" altLang="zh-TW" sz="3200" dirty="0"/>
+              <a:rPr lang="zh-TW" altLang="en-US" sz="2800" dirty="0"/>
+              <a:t> </a:t>
+            </a:r>
+            <a:r>
+              <a:rPr lang="en-US" altLang="zh-TW" sz="2800" dirty="0"/>
               <a:t>a</a:t>
             </a:r>
             <a:r>
-              <a:rPr lang="zh-TW" altLang="en-US" sz="3200" dirty="0"/>
-              <a:t> </a:t>
-            </a:r>
-            <a:r>
-              <a:rPr lang="en-US" altLang="zh-TW" sz="3200" dirty="0"/>
+              <a:rPr lang="zh-TW" altLang="en-US" sz="2800" dirty="0"/>
+              <a:t> </a:t>
+            </a:r>
+            <a:r>
+              <a:rPr lang="en-US" altLang="zh-TW" sz="2800" dirty="0"/>
               <a:t>lot</a:t>
             </a:r>
             <a:r>
-              <a:rPr lang="zh-TW" altLang="en-US" sz="3200" dirty="0"/>
-              <a:t> </a:t>
-            </a:r>
-            <a:r>
-              <a:rPr lang="en-US" altLang="zh-TW" sz="3200" dirty="0"/>
+              <a:rPr lang="zh-TW" altLang="en-US" sz="2800" dirty="0"/>
+              <a:t> </a:t>
+            </a:r>
+            <a:r>
+              <a:rPr lang="en-US" altLang="zh-TW" sz="2800" dirty="0"/>
               <a:t>time</a:t>
             </a:r>
-            <a:endParaRPr lang="zh-TW" altLang="zh-TW" sz="3200" dirty="0"/>
+            <a:endParaRPr lang="zh-TW" altLang="zh-TW" sz="2800" dirty="0"/>
           </a:p>
         </p:txBody>
       </p:sp>
@@ -19801,7 +20392,12 @@
             <p:ph idx="1"/>
           </p:nvPr>
         </p:nvSpPr>
-        <p:spPr/>
+        <p:spPr>
+          <a:xfrm>
+            <a:off x="2382252" y="2171700"/>
+            <a:ext cx="9601200" cy="3581400"/>
+          </a:xfrm>
+        </p:spPr>
         <p:txBody>
           <a:bodyPr>
             <a:normAutofit/>
@@ -19832,6 +20428,14 @@
               <a:rPr lang="zh-TW" altLang="en-US" sz="2800" dirty="0" smtClean="0"/>
               <a:t> </a:t>
             </a:r>
+            <a:r>
+              <a:rPr lang="en-US" altLang="zh-TW" sz="2800" dirty="0" smtClean="0"/>
+              <a:t>a</a:t>
+            </a:r>
+            <a:r>
+              <a:rPr lang="en-US" altLang="zh-TW" sz="2800" dirty="0" smtClean="0"/>
+              <a:t>lgorithm</a:t>
+            </a:r>
             <a:endParaRPr lang="en-US" altLang="zh-TW" sz="2800" dirty="0"/>
           </a:p>
           <a:p>
@@ -19851,13 +20455,6 @@
               <a:rPr lang="en-US" altLang="zh-TW" sz="2800" dirty="0" smtClean="0"/>
               <a:t>progressing</a:t>
             </a:r>
-          </a:p>
-          <a:p>
-            <a:r>
-              <a:rPr lang="zh-TW" altLang="en-US" sz="2800" dirty="0"/>
-              <a:t> </a:t>
-            </a:r>
-            <a:endParaRPr kumimoji="1" lang="zh-TW" altLang="en-US" sz="2800" dirty="0"/>
           </a:p>
         </p:txBody>
       </p:sp>
@@ -22049,24 +22646,7 @@
                 <a:latin typeface="+mj-ea"/>
                 <a:ea typeface="+mj-ea"/>
               </a:rPr>
-              <a:t>type&gt;</a:t>
-            </a:r>
-            <a:r>
-              <a:rPr lang="zh-TW" altLang="en-US" sz="2200" dirty="0">
-                <a:solidFill>
-                  <a:srgbClr val="FF0000"/>
-                </a:solidFill>
-                <a:latin typeface="+mj-ea"/>
-                <a:ea typeface="+mj-ea"/>
-              </a:rPr>
-              <a:t>quarter</a:t>
-            </a:r>
-            <a:r>
-              <a:rPr lang="zh-TW" altLang="en-US" sz="2200" dirty="0">
-                <a:latin typeface="+mj-ea"/>
-                <a:ea typeface="+mj-ea"/>
-              </a:rPr>
-              <a:t>&lt;/type</a:t>
+              <a:t>type&gt;quarter&lt;/type</a:t>
             </a:r>
             <a:r>
               <a:rPr lang="zh-TW" altLang="en-US" sz="2200" dirty="0" smtClean="0">
@@ -22134,24 +22714,7 @@
                 <a:latin typeface="+mj-ea"/>
                 <a:ea typeface="+mj-ea"/>
               </a:rPr>
-              <a:t>staff&gt;</a:t>
-            </a:r>
-            <a:r>
-              <a:rPr lang="zh-TW" altLang="en-US" sz="2200" dirty="0">
-                <a:solidFill>
-                  <a:srgbClr val="FF0000"/>
-                </a:solidFill>
-                <a:latin typeface="+mj-ea"/>
-                <a:ea typeface="+mj-ea"/>
-              </a:rPr>
-              <a:t>1</a:t>
-            </a:r>
-            <a:r>
-              <a:rPr lang="zh-TW" altLang="en-US" sz="2200" dirty="0">
-                <a:latin typeface="+mj-ea"/>
-                <a:ea typeface="+mj-ea"/>
-              </a:rPr>
-              <a:t>&lt;/staff</a:t>
+              <a:t>staff&gt;1&lt;/staff</a:t>
             </a:r>
             <a:r>
               <a:rPr lang="zh-TW" altLang="en-US" sz="2200" dirty="0" smtClean="0">
@@ -22314,7 +22877,7 @@
         </p:nvGrpSpPr>
         <p:grpSpPr>
           <a:xfrm>
-            <a:off x="6172200" y="801628"/>
+            <a:off x="6124143" y="879993"/>
             <a:ext cx="5929106" cy="5594972"/>
             <a:chOff x="5095187" y="231421"/>
             <a:chExt cx="6577133" cy="6206479"/>
@@ -23704,7 +24267,83 @@
   <p:timing>
     <p:tnLst>
       <p:par>
-        <p:cTn id="1" dur="indefinite" restart="never" nodeType="tmRoot"/>
+        <p:cTn id="1" dur="indefinite" restart="never" nodeType="tmRoot">
+          <p:childTnLst>
+            <p:seq concurrent="1" nextAc="seek">
+              <p:cTn id="2" dur="indefinite" nodeType="mainSeq">
+                <p:childTnLst>
+                  <p:par>
+                    <p:cTn id="3" fill="hold">
+                      <p:stCondLst>
+                        <p:cond delay="indefinite"/>
+                      </p:stCondLst>
+                      <p:childTnLst>
+                        <p:par>
+                          <p:cTn id="4" fill="hold">
+                            <p:stCondLst>
+                              <p:cond delay="0"/>
+                            </p:stCondLst>
+                            <p:childTnLst>
+                              <p:par>
+                                <p:cTn id="5" presetID="14" presetClass="entr" presetSubtype="10" fill="hold" nodeType="clickEffect">
+                                  <p:stCondLst>
+                                    <p:cond delay="0"/>
+                                  </p:stCondLst>
+                                  <p:childTnLst>
+                                    <p:set>
+                                      <p:cBhvr>
+                                        <p:cTn id="6" dur="1" fill="hold">
+                                          <p:stCondLst>
+                                            <p:cond delay="0"/>
+                                          </p:stCondLst>
+                                        </p:cTn>
+                                        <p:tgtEl>
+                                          <p:spTgt spid="20"/>
+                                        </p:tgtEl>
+                                        <p:attrNameLst>
+                                          <p:attrName>style.visibility</p:attrName>
+                                        </p:attrNameLst>
+                                      </p:cBhvr>
+                                      <p:to>
+                                        <p:strVal val="visible"/>
+                                      </p:to>
+                                    </p:set>
+                                    <p:animEffect transition="in" filter="randombar(horizontal)">
+                                      <p:cBhvr>
+                                        <p:cTn id="7" dur="500"/>
+                                        <p:tgtEl>
+                                          <p:spTgt spid="20"/>
+                                        </p:tgtEl>
+                                      </p:cBhvr>
+                                    </p:animEffect>
+                                  </p:childTnLst>
+                                </p:cTn>
+                              </p:par>
+                            </p:childTnLst>
+                          </p:cTn>
+                        </p:par>
+                      </p:childTnLst>
+                    </p:cTn>
+                  </p:par>
+                </p:childTnLst>
+              </p:cTn>
+              <p:prevCondLst>
+                <p:cond evt="onPrev" delay="0">
+                  <p:tgtEl>
+                    <p:sldTgt/>
+                  </p:tgtEl>
+                </p:cond>
+              </p:prevCondLst>
+              <p:nextCondLst>
+                <p:cond evt="onNext" delay="0">
+                  <p:tgtEl>
+                    <p:sldTgt/>
+                  </p:tgtEl>
+                </p:cond>
+              </p:nextCondLst>
+            </p:seq>
+          </p:childTnLst>
+        </p:cTn>
       </p:par>
     </p:tnLst>
   </p:timing>

</xml_diff>